<commit_message>
Ideological and Political Meeting Version Record
</commit_message>
<xml_diff>
--- a/figures/figure1.pptx
+++ b/figures/figure1.pptx
@@ -6,6 +6,7 @@
   </p:sldMasterIdLst>
   <p:sldIdLst>
     <p:sldId id="256" r:id="rId2"/>
+    <p:sldId id="257" r:id="rId3"/>
   </p:sldIdLst>
   <p:sldSz cx="12192000" cy="6858000"/>
   <p:notesSz cx="6858000" cy="9144000"/>
@@ -104,6 +105,11 @@
       </a:defRPr>
     </a:lvl9pPr>
   </p:defaultTextStyle>
+  <p:extLst>
+    <p:ext uri="{EFAFB233-063F-42B5-8137-9DF3F51BA10A}">
+      <p15:sldGuideLst xmlns:p15="http://schemas.microsoft.com/office/powerpoint/2012/main"/>
+    </p:ext>
+  </p:extLst>
 </p:presentation>
 </file>
 
@@ -254,7 +260,7 @@
           <a:p>
             <a:fld id="{F202290A-9581-A748-A9F1-48CBAE9D7304}" type="datetimeFigureOut">
               <a:rPr kumimoji="1" lang="zh-TW" altLang="en-US" smtClean="0"/>
-              <a:t>2021/7/5</a:t>
+              <a:t>2021/7/14</a:t>
             </a:fld>
             <a:endParaRPr kumimoji="1" lang="zh-TW" altLang="en-US"/>
           </a:p>
@@ -452,7 +458,7 @@
           <a:p>
             <a:fld id="{F202290A-9581-A748-A9F1-48CBAE9D7304}" type="datetimeFigureOut">
               <a:rPr kumimoji="1" lang="zh-TW" altLang="en-US" smtClean="0"/>
-              <a:t>2021/7/5</a:t>
+              <a:t>2021/7/14</a:t>
             </a:fld>
             <a:endParaRPr kumimoji="1" lang="zh-TW" altLang="en-US"/>
           </a:p>
@@ -660,7 +666,7 @@
           <a:p>
             <a:fld id="{F202290A-9581-A748-A9F1-48CBAE9D7304}" type="datetimeFigureOut">
               <a:rPr kumimoji="1" lang="zh-TW" altLang="en-US" smtClean="0"/>
-              <a:t>2021/7/5</a:t>
+              <a:t>2021/7/14</a:t>
             </a:fld>
             <a:endParaRPr kumimoji="1" lang="zh-TW" altLang="en-US"/>
           </a:p>
@@ -858,7 +864,7 @@
           <a:p>
             <a:fld id="{F202290A-9581-A748-A9F1-48CBAE9D7304}" type="datetimeFigureOut">
               <a:rPr kumimoji="1" lang="zh-TW" altLang="en-US" smtClean="0"/>
-              <a:t>2021/7/5</a:t>
+              <a:t>2021/7/14</a:t>
             </a:fld>
             <a:endParaRPr kumimoji="1" lang="zh-TW" altLang="en-US"/>
           </a:p>
@@ -1133,7 +1139,7 @@
           <a:p>
             <a:fld id="{F202290A-9581-A748-A9F1-48CBAE9D7304}" type="datetimeFigureOut">
               <a:rPr kumimoji="1" lang="zh-TW" altLang="en-US" smtClean="0"/>
-              <a:t>2021/7/5</a:t>
+              <a:t>2021/7/14</a:t>
             </a:fld>
             <a:endParaRPr kumimoji="1" lang="zh-TW" altLang="en-US"/>
           </a:p>
@@ -1398,7 +1404,7 @@
           <a:p>
             <a:fld id="{F202290A-9581-A748-A9F1-48CBAE9D7304}" type="datetimeFigureOut">
               <a:rPr kumimoji="1" lang="zh-TW" altLang="en-US" smtClean="0"/>
-              <a:t>2021/7/5</a:t>
+              <a:t>2021/7/14</a:t>
             </a:fld>
             <a:endParaRPr kumimoji="1" lang="zh-TW" altLang="en-US"/>
           </a:p>
@@ -1810,7 +1816,7 @@
           <a:p>
             <a:fld id="{F202290A-9581-A748-A9F1-48CBAE9D7304}" type="datetimeFigureOut">
               <a:rPr kumimoji="1" lang="zh-TW" altLang="en-US" smtClean="0"/>
-              <a:t>2021/7/5</a:t>
+              <a:t>2021/7/14</a:t>
             </a:fld>
             <a:endParaRPr kumimoji="1" lang="zh-TW" altLang="en-US"/>
           </a:p>
@@ -1951,7 +1957,7 @@
           <a:p>
             <a:fld id="{F202290A-9581-A748-A9F1-48CBAE9D7304}" type="datetimeFigureOut">
               <a:rPr kumimoji="1" lang="zh-TW" altLang="en-US" smtClean="0"/>
-              <a:t>2021/7/5</a:t>
+              <a:t>2021/7/14</a:t>
             </a:fld>
             <a:endParaRPr kumimoji="1" lang="zh-TW" altLang="en-US"/>
           </a:p>
@@ -2064,7 +2070,7 @@
           <a:p>
             <a:fld id="{F202290A-9581-A748-A9F1-48CBAE9D7304}" type="datetimeFigureOut">
               <a:rPr kumimoji="1" lang="zh-TW" altLang="en-US" smtClean="0"/>
-              <a:t>2021/7/5</a:t>
+              <a:t>2021/7/14</a:t>
             </a:fld>
             <a:endParaRPr kumimoji="1" lang="zh-TW" altLang="en-US"/>
           </a:p>
@@ -2375,7 +2381,7 @@
           <a:p>
             <a:fld id="{F202290A-9581-A748-A9F1-48CBAE9D7304}" type="datetimeFigureOut">
               <a:rPr kumimoji="1" lang="zh-TW" altLang="en-US" smtClean="0"/>
-              <a:t>2021/7/5</a:t>
+              <a:t>2021/7/14</a:t>
             </a:fld>
             <a:endParaRPr kumimoji="1" lang="zh-TW" altLang="en-US"/>
           </a:p>
@@ -2663,7 +2669,7 @@
           <a:p>
             <a:fld id="{F202290A-9581-A748-A9F1-48CBAE9D7304}" type="datetimeFigureOut">
               <a:rPr kumimoji="1" lang="zh-TW" altLang="en-US" smtClean="0"/>
-              <a:t>2021/7/5</a:t>
+              <a:t>2021/7/14</a:t>
             </a:fld>
             <a:endParaRPr kumimoji="1" lang="zh-TW" altLang="en-US"/>
           </a:p>
@@ -2904,7 +2910,7 @@
           <a:p>
             <a:fld id="{F202290A-9581-A748-A9F1-48CBAE9D7304}" type="datetimeFigureOut">
               <a:rPr kumimoji="1" lang="zh-TW" altLang="en-US" smtClean="0"/>
-              <a:t>2021/7/5</a:t>
+              <a:t>2021/7/14</a:t>
             </a:fld>
             <a:endParaRPr kumimoji="1" lang="zh-TW" altLang="en-US"/>
           </a:p>
@@ -6113,6 +6119,1798 @@
 </p:sld>
 </file>
 
+<file path=ppt/slides/slide2.xml><?xml version="1.0" encoding="utf-8"?>
+<p:sld xmlns:a="http://schemas.openxmlformats.org/drawingml/2006/main" xmlns:r="http://schemas.openxmlformats.org/officeDocument/2006/relationships" xmlns:p="http://schemas.openxmlformats.org/presentationml/2006/main">
+  <p:cSld>
+    <p:spTree>
+      <p:nvGrpSpPr>
+        <p:cNvPr id="1" name=""/>
+        <p:cNvGrpSpPr/>
+        <p:nvPr/>
+      </p:nvGrpSpPr>
+      <p:grpSpPr>
+        <a:xfrm>
+          <a:off x="0" y="0"/>
+          <a:ext cx="0" cy="0"/>
+          <a:chOff x="0" y="0"/>
+          <a:chExt cx="0" cy="0"/>
+        </a:xfrm>
+      </p:grpSpPr>
+      <p:grpSp>
+        <p:nvGrpSpPr>
+          <p:cNvPr id="22" name="群組 21">
+            <a:extLst>
+              <a:ext uri="{FF2B5EF4-FFF2-40B4-BE49-F238E27FC236}">
+                <a16:creationId xmlns:a16="http://schemas.microsoft.com/office/drawing/2014/main" id="{2FA3668F-86D4-264E-8ADD-B8D739C5931B}"/>
+              </a:ext>
+            </a:extLst>
+          </p:cNvPr>
+          <p:cNvGrpSpPr/>
+          <p:nvPr/>
+        </p:nvGrpSpPr>
+        <p:grpSpPr>
+          <a:xfrm>
+            <a:off x="2290758" y="1794020"/>
+            <a:ext cx="2229321" cy="522487"/>
+            <a:chOff x="2359878" y="1356189"/>
+            <a:chExt cx="2229321" cy="522487"/>
+          </a:xfrm>
+        </p:grpSpPr>
+        <p:sp>
+          <p:nvSpPr>
+            <p:cNvPr id="23" name="矩形 22">
+              <a:extLst>
+                <a:ext uri="{FF2B5EF4-FFF2-40B4-BE49-F238E27FC236}">
+                  <a16:creationId xmlns:a16="http://schemas.microsoft.com/office/drawing/2014/main" id="{49B1810E-BB03-BE49-B240-348B6837E3E8}"/>
+                </a:ext>
+              </a:extLst>
+            </p:cNvPr>
+            <p:cNvSpPr/>
+            <p:nvPr/>
+          </p:nvSpPr>
+          <p:spPr>
+            <a:xfrm>
+              <a:off x="2359878" y="1356189"/>
+              <a:ext cx="2229321" cy="522487"/>
+            </a:xfrm>
+            <a:prstGeom prst="rect">
+              <a:avLst/>
+            </a:prstGeom>
+            <a:noFill/>
+            <a:ln w="19050">
+              <a:solidFill>
+                <a:schemeClr val="tx1"/>
+              </a:solidFill>
+            </a:ln>
+          </p:spPr>
+          <p:style>
+            <a:lnRef idx="2">
+              <a:schemeClr val="accent1">
+                <a:shade val="50000"/>
+              </a:schemeClr>
+            </a:lnRef>
+            <a:fillRef idx="1">
+              <a:schemeClr val="accent1"/>
+            </a:fillRef>
+            <a:effectRef idx="0">
+              <a:schemeClr val="accent1"/>
+            </a:effectRef>
+            <a:fontRef idx="minor">
+              <a:schemeClr val="lt1"/>
+            </a:fontRef>
+          </p:style>
+          <p:txBody>
+            <a:bodyPr rtlCol="0" anchor="ctr"/>
+            <a:lstStyle/>
+            <a:p>
+              <a:pPr algn="ctr"/>
+              <a:endParaRPr kumimoji="1" lang="zh-TW" altLang="en-US" dirty="0">
+                <a:latin typeface="SimSun" panose="02010600030101010101" pitchFamily="2" charset="-122"/>
+                <a:ea typeface="SimSun" panose="02010600030101010101" pitchFamily="2" charset="-122"/>
+              </a:endParaRPr>
+            </a:p>
+          </p:txBody>
+        </p:sp>
+        <p:sp>
+          <p:nvSpPr>
+            <p:cNvPr id="24" name="文字方塊 23">
+              <a:extLst>
+                <a:ext uri="{FF2B5EF4-FFF2-40B4-BE49-F238E27FC236}">
+                  <a16:creationId xmlns:a16="http://schemas.microsoft.com/office/drawing/2014/main" id="{8EF99EFC-90EE-6B47-8DC0-1F533F9F49AC}"/>
+                </a:ext>
+              </a:extLst>
+            </p:cNvPr>
+            <p:cNvSpPr txBox="1"/>
+            <p:nvPr/>
+          </p:nvSpPr>
+          <p:spPr>
+            <a:xfrm>
+              <a:off x="2731001" y="1433241"/>
+              <a:ext cx="1569660" cy="369332"/>
+            </a:xfrm>
+            <a:prstGeom prst="rect">
+              <a:avLst/>
+            </a:prstGeom>
+            <a:noFill/>
+          </p:spPr>
+          <p:txBody>
+            <a:bodyPr wrap="none" rtlCol="0">
+              <a:spAutoFit/>
+            </a:bodyPr>
+            <a:lstStyle/>
+            <a:p>
+              <a:pPr algn="ctr"/>
+              <a:r>
+                <a:rPr kumimoji="1" lang="zh-TW" altLang="en-US" dirty="0">
+                  <a:latin typeface="SimSun" panose="02010600030101010101" pitchFamily="2" charset="-122"/>
+                  <a:ea typeface="SimSun" panose="02010600030101010101" pitchFamily="2" charset="-122"/>
+                </a:rPr>
+                <a:t>传统思政课程</a:t>
+              </a:r>
+            </a:p>
+          </p:txBody>
+        </p:sp>
+      </p:grpSp>
+      <p:grpSp>
+        <p:nvGrpSpPr>
+          <p:cNvPr id="25" name="群組 24">
+            <a:extLst>
+              <a:ext uri="{FF2B5EF4-FFF2-40B4-BE49-F238E27FC236}">
+                <a16:creationId xmlns:a16="http://schemas.microsoft.com/office/drawing/2014/main" id="{20BCD7B5-B76F-3448-8142-9D14B38F424D}"/>
+              </a:ext>
+            </a:extLst>
+          </p:cNvPr>
+          <p:cNvGrpSpPr/>
+          <p:nvPr/>
+        </p:nvGrpSpPr>
+        <p:grpSpPr>
+          <a:xfrm>
+            <a:off x="2310891" y="3075069"/>
+            <a:ext cx="2229321" cy="522487"/>
+            <a:chOff x="2359879" y="1356189"/>
+            <a:chExt cx="2229321" cy="522487"/>
+          </a:xfrm>
+        </p:grpSpPr>
+        <p:sp>
+          <p:nvSpPr>
+            <p:cNvPr id="26" name="矩形 25">
+              <a:extLst>
+                <a:ext uri="{FF2B5EF4-FFF2-40B4-BE49-F238E27FC236}">
+                  <a16:creationId xmlns:a16="http://schemas.microsoft.com/office/drawing/2014/main" id="{D9720B15-3827-BF47-9689-8F3D2D225F2D}"/>
+                </a:ext>
+              </a:extLst>
+            </p:cNvPr>
+            <p:cNvSpPr/>
+            <p:nvPr/>
+          </p:nvSpPr>
+          <p:spPr>
+            <a:xfrm>
+              <a:off x="2359879" y="1356189"/>
+              <a:ext cx="2229321" cy="522487"/>
+            </a:xfrm>
+            <a:prstGeom prst="rect">
+              <a:avLst/>
+            </a:prstGeom>
+            <a:noFill/>
+            <a:ln w="19050">
+              <a:solidFill>
+                <a:schemeClr val="tx1"/>
+              </a:solidFill>
+            </a:ln>
+          </p:spPr>
+          <p:style>
+            <a:lnRef idx="2">
+              <a:schemeClr val="accent1">
+                <a:shade val="50000"/>
+              </a:schemeClr>
+            </a:lnRef>
+            <a:fillRef idx="1">
+              <a:schemeClr val="accent1"/>
+            </a:fillRef>
+            <a:effectRef idx="0">
+              <a:schemeClr val="accent1"/>
+            </a:effectRef>
+            <a:fontRef idx="minor">
+              <a:schemeClr val="lt1"/>
+            </a:fontRef>
+          </p:style>
+          <p:txBody>
+            <a:bodyPr rtlCol="0" anchor="ctr"/>
+            <a:lstStyle/>
+            <a:p>
+              <a:pPr algn="ctr"/>
+              <a:endParaRPr kumimoji="1" lang="zh-TW" altLang="en-US" dirty="0">
+                <a:latin typeface="SimSun" panose="02010600030101010101" pitchFamily="2" charset="-122"/>
+                <a:ea typeface="SimSun" panose="02010600030101010101" pitchFamily="2" charset="-122"/>
+              </a:endParaRPr>
+            </a:p>
+          </p:txBody>
+        </p:sp>
+        <p:sp>
+          <p:nvSpPr>
+            <p:cNvPr id="27" name="文字方塊 26">
+              <a:extLst>
+                <a:ext uri="{FF2B5EF4-FFF2-40B4-BE49-F238E27FC236}">
+                  <a16:creationId xmlns:a16="http://schemas.microsoft.com/office/drawing/2014/main" id="{9CA5D5FE-B29B-9E4C-A5EA-C113ABAB26DA}"/>
+                </a:ext>
+              </a:extLst>
+            </p:cNvPr>
+            <p:cNvSpPr txBox="1"/>
+            <p:nvPr/>
+          </p:nvSpPr>
+          <p:spPr>
+            <a:xfrm>
+              <a:off x="2920544" y="1432766"/>
+              <a:ext cx="1107996" cy="369332"/>
+            </a:xfrm>
+            <a:prstGeom prst="rect">
+              <a:avLst/>
+            </a:prstGeom>
+            <a:noFill/>
+          </p:spPr>
+          <p:txBody>
+            <a:bodyPr wrap="none" rtlCol="0">
+              <a:spAutoFit/>
+            </a:bodyPr>
+            <a:lstStyle/>
+            <a:p>
+              <a:pPr algn="ctr"/>
+              <a:r>
+                <a:rPr kumimoji="1" lang="zh-TW" altLang="en-US" dirty="0">
+                  <a:latin typeface="SimSun" panose="02010600030101010101" pitchFamily="2" charset="-122"/>
+                  <a:ea typeface="SimSun" panose="02010600030101010101" pitchFamily="2" charset="-122"/>
+                </a:rPr>
+                <a:t>课程思政</a:t>
+              </a:r>
+            </a:p>
+          </p:txBody>
+        </p:sp>
+      </p:grpSp>
+      <p:cxnSp>
+        <p:nvCxnSpPr>
+          <p:cNvPr id="67" name="直線箭頭接點 66">
+            <a:extLst>
+              <a:ext uri="{FF2B5EF4-FFF2-40B4-BE49-F238E27FC236}">
+                <a16:creationId xmlns:a16="http://schemas.microsoft.com/office/drawing/2014/main" id="{5A2E8678-6808-2B4A-830D-5431F18FD28D}"/>
+              </a:ext>
+            </a:extLst>
+          </p:cNvPr>
+          <p:cNvCxnSpPr>
+            <a:cxnSpLocks/>
+            <a:stCxn id="23" idx="3"/>
+            <a:endCxn id="61" idx="1"/>
+          </p:cNvCxnSpPr>
+          <p:nvPr/>
+        </p:nvCxnSpPr>
+        <p:spPr>
+          <a:xfrm>
+            <a:off x="4520079" y="2055264"/>
+            <a:ext cx="713347" cy="595815"/>
+          </a:xfrm>
+          <a:prstGeom prst="straightConnector1">
+            <a:avLst/>
+          </a:prstGeom>
+          <a:ln>
+            <a:tailEnd type="triangle"/>
+          </a:ln>
+        </p:spPr>
+        <p:style>
+          <a:lnRef idx="1">
+            <a:schemeClr val="dk1"/>
+          </a:lnRef>
+          <a:fillRef idx="0">
+            <a:schemeClr val="dk1"/>
+          </a:fillRef>
+          <a:effectRef idx="0">
+            <a:schemeClr val="dk1"/>
+          </a:effectRef>
+          <a:fontRef idx="minor">
+            <a:schemeClr val="tx1"/>
+          </a:fontRef>
+        </p:style>
+      </p:cxnSp>
+      <p:cxnSp>
+        <p:nvCxnSpPr>
+          <p:cNvPr id="70" name="直線箭頭接點 69">
+            <a:extLst>
+              <a:ext uri="{FF2B5EF4-FFF2-40B4-BE49-F238E27FC236}">
+                <a16:creationId xmlns:a16="http://schemas.microsoft.com/office/drawing/2014/main" id="{BD43C713-C6E4-424F-9633-6DE5563B04ED}"/>
+              </a:ext>
+            </a:extLst>
+          </p:cNvPr>
+          <p:cNvCxnSpPr>
+            <a:cxnSpLocks/>
+            <a:stCxn id="26" idx="3"/>
+            <a:endCxn id="61" idx="1"/>
+          </p:cNvCxnSpPr>
+          <p:nvPr/>
+        </p:nvCxnSpPr>
+        <p:spPr>
+          <a:xfrm flipV="1">
+            <a:off x="4540212" y="2651079"/>
+            <a:ext cx="693214" cy="685234"/>
+          </a:xfrm>
+          <a:prstGeom prst="straightConnector1">
+            <a:avLst/>
+          </a:prstGeom>
+          <a:ln>
+            <a:tailEnd type="triangle"/>
+          </a:ln>
+        </p:spPr>
+        <p:style>
+          <a:lnRef idx="1">
+            <a:schemeClr val="dk1"/>
+          </a:lnRef>
+          <a:fillRef idx="0">
+            <a:schemeClr val="dk1"/>
+          </a:fillRef>
+          <a:effectRef idx="0">
+            <a:schemeClr val="dk1"/>
+          </a:effectRef>
+          <a:fontRef idx="minor">
+            <a:schemeClr val="tx1"/>
+          </a:fontRef>
+        </p:style>
+      </p:cxnSp>
+      <p:grpSp>
+        <p:nvGrpSpPr>
+          <p:cNvPr id="62" name="群組 61">
+            <a:extLst>
+              <a:ext uri="{FF2B5EF4-FFF2-40B4-BE49-F238E27FC236}">
+                <a16:creationId xmlns:a16="http://schemas.microsoft.com/office/drawing/2014/main" id="{CF2C5EDF-BDA7-3347-B11B-078BF84C26AA}"/>
+              </a:ext>
+            </a:extLst>
+          </p:cNvPr>
+          <p:cNvGrpSpPr/>
+          <p:nvPr/>
+        </p:nvGrpSpPr>
+        <p:grpSpPr>
+          <a:xfrm>
+            <a:off x="5233426" y="1685241"/>
+            <a:ext cx="3308465" cy="1931675"/>
+            <a:chOff x="6567055" y="3321969"/>
+            <a:chExt cx="3308465" cy="1931675"/>
+          </a:xfrm>
+        </p:grpSpPr>
+        <p:grpSp>
+          <p:nvGrpSpPr>
+            <p:cNvPr id="42" name="群組 41">
+              <a:extLst>
+                <a:ext uri="{FF2B5EF4-FFF2-40B4-BE49-F238E27FC236}">
+                  <a16:creationId xmlns:a16="http://schemas.microsoft.com/office/drawing/2014/main" id="{653180D5-1A26-394B-991B-8EBD5056EBDD}"/>
+                </a:ext>
+              </a:extLst>
+            </p:cNvPr>
+            <p:cNvGrpSpPr/>
+            <p:nvPr/>
+          </p:nvGrpSpPr>
+          <p:grpSpPr>
+            <a:xfrm>
+              <a:off x="6636978" y="3442145"/>
+              <a:ext cx="1531188" cy="355112"/>
+              <a:chOff x="6507344" y="3778828"/>
+              <a:chExt cx="1531188" cy="355112"/>
+            </a:xfrm>
+          </p:grpSpPr>
+          <p:sp>
+            <p:nvSpPr>
+              <p:cNvPr id="40" name="矩形 39">
+                <a:extLst>
+                  <a:ext uri="{FF2B5EF4-FFF2-40B4-BE49-F238E27FC236}">
+                    <a16:creationId xmlns:a16="http://schemas.microsoft.com/office/drawing/2014/main" id="{5EBCE88E-D47B-824B-9045-4314EA4A81ED}"/>
+                  </a:ext>
+                </a:extLst>
+              </p:cNvPr>
+              <p:cNvSpPr/>
+              <p:nvPr/>
+            </p:nvSpPr>
+            <p:spPr>
+              <a:xfrm>
+                <a:off x="6549264" y="3785824"/>
+                <a:ext cx="1447349" cy="348116"/>
+              </a:xfrm>
+              <a:prstGeom prst="rect">
+                <a:avLst/>
+              </a:prstGeom>
+              <a:noFill/>
+              <a:ln w="19050">
+                <a:solidFill>
+                  <a:schemeClr val="tx1"/>
+                </a:solidFill>
+              </a:ln>
+            </p:spPr>
+            <p:style>
+              <a:lnRef idx="2">
+                <a:schemeClr val="accent1">
+                  <a:shade val="50000"/>
+                </a:schemeClr>
+              </a:lnRef>
+              <a:fillRef idx="1">
+                <a:schemeClr val="accent1"/>
+              </a:fillRef>
+              <a:effectRef idx="0">
+                <a:schemeClr val="accent1"/>
+              </a:effectRef>
+              <a:fontRef idx="minor">
+                <a:schemeClr val="lt1"/>
+              </a:fontRef>
+            </p:style>
+            <p:txBody>
+              <a:bodyPr rtlCol="0" anchor="ctr"/>
+              <a:lstStyle/>
+              <a:p>
+                <a:pPr algn="ctr"/>
+                <a:endParaRPr kumimoji="1" lang="zh-TW" altLang="en-US" dirty="0">
+                  <a:latin typeface="SimSun" panose="02010600030101010101" pitchFamily="2" charset="-122"/>
+                  <a:ea typeface="SimSun" panose="02010600030101010101" pitchFamily="2" charset="-122"/>
+                </a:endParaRPr>
+              </a:p>
+            </p:txBody>
+          </p:sp>
+          <p:sp>
+            <p:nvSpPr>
+              <p:cNvPr id="41" name="文字方塊 40">
+                <a:extLst>
+                  <a:ext uri="{FF2B5EF4-FFF2-40B4-BE49-F238E27FC236}">
+                    <a16:creationId xmlns:a16="http://schemas.microsoft.com/office/drawing/2014/main" id="{0F6AA5D5-9120-6447-A615-04DDC5CB0DE2}"/>
+                  </a:ext>
+                </a:extLst>
+              </p:cNvPr>
+              <p:cNvSpPr txBox="1"/>
+              <p:nvPr/>
+            </p:nvSpPr>
+            <p:spPr>
+              <a:xfrm>
+                <a:off x="6507344" y="3778828"/>
+                <a:ext cx="1531188" cy="323165"/>
+              </a:xfrm>
+              <a:prstGeom prst="rect">
+                <a:avLst/>
+              </a:prstGeom>
+              <a:noFill/>
+            </p:spPr>
+            <p:txBody>
+              <a:bodyPr wrap="square" rtlCol="0">
+                <a:spAutoFit/>
+              </a:bodyPr>
+              <a:lstStyle/>
+              <a:p>
+                <a:pPr algn="ctr"/>
+                <a:r>
+                  <a:rPr kumimoji="1" lang="zh-TW" altLang="en-US" sz="1500" dirty="0">
+                    <a:latin typeface="SimSun" panose="02010600030101010101" pitchFamily="2" charset="-122"/>
+                    <a:ea typeface="SimSun" panose="02010600030101010101" pitchFamily="2" charset="-122"/>
+                  </a:rPr>
+                  <a:t>国家的认证能力</a:t>
+                </a:r>
+              </a:p>
+            </p:txBody>
+          </p:sp>
+        </p:grpSp>
+        <p:grpSp>
+          <p:nvGrpSpPr>
+            <p:cNvPr id="43" name="群組 42">
+              <a:extLst>
+                <a:ext uri="{FF2B5EF4-FFF2-40B4-BE49-F238E27FC236}">
+                  <a16:creationId xmlns:a16="http://schemas.microsoft.com/office/drawing/2014/main" id="{090F2860-E9FA-EF4E-8996-BED864F5977C}"/>
+                </a:ext>
+              </a:extLst>
+            </p:cNvPr>
+            <p:cNvGrpSpPr/>
+            <p:nvPr/>
+          </p:nvGrpSpPr>
+          <p:grpSpPr>
+            <a:xfrm>
+              <a:off x="6636978" y="3869509"/>
+              <a:ext cx="1531188" cy="355112"/>
+              <a:chOff x="6507344" y="3778828"/>
+              <a:chExt cx="1531188" cy="355112"/>
+            </a:xfrm>
+          </p:grpSpPr>
+          <p:sp>
+            <p:nvSpPr>
+              <p:cNvPr id="44" name="矩形 43">
+                <a:extLst>
+                  <a:ext uri="{FF2B5EF4-FFF2-40B4-BE49-F238E27FC236}">
+                    <a16:creationId xmlns:a16="http://schemas.microsoft.com/office/drawing/2014/main" id="{C811BA94-B7D6-1D48-AA60-B90BEFED97F0}"/>
+                  </a:ext>
+                </a:extLst>
+              </p:cNvPr>
+              <p:cNvSpPr/>
+              <p:nvPr/>
+            </p:nvSpPr>
+            <p:spPr>
+              <a:xfrm>
+                <a:off x="6549264" y="3785824"/>
+                <a:ext cx="1447349" cy="348116"/>
+              </a:xfrm>
+              <a:prstGeom prst="rect">
+                <a:avLst/>
+              </a:prstGeom>
+              <a:noFill/>
+              <a:ln w="19050">
+                <a:solidFill>
+                  <a:schemeClr val="tx1"/>
+                </a:solidFill>
+              </a:ln>
+            </p:spPr>
+            <p:style>
+              <a:lnRef idx="2">
+                <a:schemeClr val="accent1">
+                  <a:shade val="50000"/>
+                </a:schemeClr>
+              </a:lnRef>
+              <a:fillRef idx="1">
+                <a:schemeClr val="accent1"/>
+              </a:fillRef>
+              <a:effectRef idx="0">
+                <a:schemeClr val="accent1"/>
+              </a:effectRef>
+              <a:fontRef idx="minor">
+                <a:schemeClr val="lt1"/>
+              </a:fontRef>
+            </p:style>
+            <p:txBody>
+              <a:bodyPr rtlCol="0" anchor="ctr"/>
+              <a:lstStyle/>
+              <a:p>
+                <a:pPr algn="ctr"/>
+                <a:endParaRPr kumimoji="1" lang="zh-TW" altLang="en-US" dirty="0">
+                  <a:latin typeface="SimSun" panose="02010600030101010101" pitchFamily="2" charset="-122"/>
+                  <a:ea typeface="SimSun" panose="02010600030101010101" pitchFamily="2" charset="-122"/>
+                </a:endParaRPr>
+              </a:p>
+            </p:txBody>
+          </p:sp>
+          <p:sp>
+            <p:nvSpPr>
+              <p:cNvPr id="45" name="文字方塊 44">
+                <a:extLst>
+                  <a:ext uri="{FF2B5EF4-FFF2-40B4-BE49-F238E27FC236}">
+                    <a16:creationId xmlns:a16="http://schemas.microsoft.com/office/drawing/2014/main" id="{B173C1DD-B594-C04E-B029-6047A1FC3C04}"/>
+                  </a:ext>
+                </a:extLst>
+              </p:cNvPr>
+              <p:cNvSpPr txBox="1"/>
+              <p:nvPr/>
+            </p:nvSpPr>
+            <p:spPr>
+              <a:xfrm>
+                <a:off x="6507344" y="3778828"/>
+                <a:ext cx="1531188" cy="323165"/>
+              </a:xfrm>
+              <a:prstGeom prst="rect">
+                <a:avLst/>
+              </a:prstGeom>
+              <a:noFill/>
+            </p:spPr>
+            <p:txBody>
+              <a:bodyPr wrap="square" rtlCol="0">
+                <a:spAutoFit/>
+              </a:bodyPr>
+              <a:lstStyle/>
+              <a:p>
+                <a:pPr algn="ctr"/>
+                <a:r>
+                  <a:rPr kumimoji="1" lang="zh-TW" altLang="en-US" sz="1500" dirty="0">
+                    <a:latin typeface="SimSun" panose="02010600030101010101" pitchFamily="2" charset="-122"/>
+                    <a:ea typeface="SimSun" panose="02010600030101010101" pitchFamily="2" charset="-122"/>
+                  </a:rPr>
+                  <a:t>国家的强制能力</a:t>
+                </a:r>
+              </a:p>
+            </p:txBody>
+          </p:sp>
+        </p:grpSp>
+        <p:grpSp>
+          <p:nvGrpSpPr>
+            <p:cNvPr id="46" name="群組 45">
+              <a:extLst>
+                <a:ext uri="{FF2B5EF4-FFF2-40B4-BE49-F238E27FC236}">
+                  <a16:creationId xmlns:a16="http://schemas.microsoft.com/office/drawing/2014/main" id="{EE9FE45C-F03A-884E-A9EF-FCFE55E76794}"/>
+                </a:ext>
+              </a:extLst>
+            </p:cNvPr>
+            <p:cNvGrpSpPr/>
+            <p:nvPr/>
+          </p:nvGrpSpPr>
+          <p:grpSpPr>
+            <a:xfrm>
+              <a:off x="6636978" y="4323535"/>
+              <a:ext cx="1531188" cy="355112"/>
+              <a:chOff x="6507344" y="3778828"/>
+              <a:chExt cx="1531188" cy="355112"/>
+            </a:xfrm>
+          </p:grpSpPr>
+          <p:sp>
+            <p:nvSpPr>
+              <p:cNvPr id="47" name="矩形 46">
+                <a:extLst>
+                  <a:ext uri="{FF2B5EF4-FFF2-40B4-BE49-F238E27FC236}">
+                    <a16:creationId xmlns:a16="http://schemas.microsoft.com/office/drawing/2014/main" id="{0E6FB35A-6534-8249-8D4E-167D487B7859}"/>
+                  </a:ext>
+                </a:extLst>
+              </p:cNvPr>
+              <p:cNvSpPr/>
+              <p:nvPr/>
+            </p:nvSpPr>
+            <p:spPr>
+              <a:xfrm>
+                <a:off x="6549264" y="3785824"/>
+                <a:ext cx="1447349" cy="348116"/>
+              </a:xfrm>
+              <a:prstGeom prst="rect">
+                <a:avLst/>
+              </a:prstGeom>
+              <a:noFill/>
+              <a:ln w="19050">
+                <a:solidFill>
+                  <a:schemeClr val="tx1"/>
+                </a:solidFill>
+              </a:ln>
+            </p:spPr>
+            <p:style>
+              <a:lnRef idx="2">
+                <a:schemeClr val="accent1">
+                  <a:shade val="50000"/>
+                </a:schemeClr>
+              </a:lnRef>
+              <a:fillRef idx="1">
+                <a:schemeClr val="accent1"/>
+              </a:fillRef>
+              <a:effectRef idx="0">
+                <a:schemeClr val="accent1"/>
+              </a:effectRef>
+              <a:fontRef idx="minor">
+                <a:schemeClr val="lt1"/>
+              </a:fontRef>
+            </p:style>
+            <p:txBody>
+              <a:bodyPr rtlCol="0" anchor="ctr"/>
+              <a:lstStyle/>
+              <a:p>
+                <a:pPr algn="ctr"/>
+                <a:endParaRPr kumimoji="1" lang="zh-TW" altLang="en-US" dirty="0">
+                  <a:latin typeface="SimSun" panose="02010600030101010101" pitchFamily="2" charset="-122"/>
+                  <a:ea typeface="SimSun" panose="02010600030101010101" pitchFamily="2" charset="-122"/>
+                </a:endParaRPr>
+              </a:p>
+            </p:txBody>
+          </p:sp>
+          <p:sp>
+            <p:nvSpPr>
+              <p:cNvPr id="48" name="文字方塊 47">
+                <a:extLst>
+                  <a:ext uri="{FF2B5EF4-FFF2-40B4-BE49-F238E27FC236}">
+                    <a16:creationId xmlns:a16="http://schemas.microsoft.com/office/drawing/2014/main" id="{8AAF51FA-BC3D-5B4C-B39A-734028C5E64B}"/>
+                  </a:ext>
+                </a:extLst>
+              </p:cNvPr>
+              <p:cNvSpPr txBox="1"/>
+              <p:nvPr/>
+            </p:nvSpPr>
+            <p:spPr>
+              <a:xfrm>
+                <a:off x="6507344" y="3778828"/>
+                <a:ext cx="1531188" cy="323165"/>
+              </a:xfrm>
+              <a:prstGeom prst="rect">
+                <a:avLst/>
+              </a:prstGeom>
+              <a:noFill/>
+            </p:spPr>
+            <p:txBody>
+              <a:bodyPr wrap="square" rtlCol="0">
+                <a:spAutoFit/>
+              </a:bodyPr>
+              <a:lstStyle/>
+              <a:p>
+                <a:pPr algn="ctr"/>
+                <a:r>
+                  <a:rPr kumimoji="1" lang="zh-TW" altLang="en-US" sz="1500" dirty="0">
+                    <a:latin typeface="SimSun" panose="02010600030101010101" pitchFamily="2" charset="-122"/>
+                    <a:ea typeface="SimSun" panose="02010600030101010101" pitchFamily="2" charset="-122"/>
+                  </a:rPr>
+                  <a:t>国家的汲取能力</a:t>
+                </a:r>
+              </a:p>
+            </p:txBody>
+          </p:sp>
+        </p:grpSp>
+        <p:grpSp>
+          <p:nvGrpSpPr>
+            <p:cNvPr id="49" name="群組 48">
+              <a:extLst>
+                <a:ext uri="{FF2B5EF4-FFF2-40B4-BE49-F238E27FC236}">
+                  <a16:creationId xmlns:a16="http://schemas.microsoft.com/office/drawing/2014/main" id="{59477C71-3FFB-3146-B645-63082FE4BE20}"/>
+                </a:ext>
+              </a:extLst>
+            </p:cNvPr>
+            <p:cNvGrpSpPr/>
+            <p:nvPr/>
+          </p:nvGrpSpPr>
+          <p:grpSpPr>
+            <a:xfrm>
+              <a:off x="6636978" y="4782855"/>
+              <a:ext cx="1531188" cy="355112"/>
+              <a:chOff x="6507344" y="3778828"/>
+              <a:chExt cx="1531188" cy="355112"/>
+            </a:xfrm>
+          </p:grpSpPr>
+          <p:sp>
+            <p:nvSpPr>
+              <p:cNvPr id="50" name="矩形 49">
+                <a:extLst>
+                  <a:ext uri="{FF2B5EF4-FFF2-40B4-BE49-F238E27FC236}">
+                    <a16:creationId xmlns:a16="http://schemas.microsoft.com/office/drawing/2014/main" id="{583C158E-6C25-6247-8688-95A67F896428}"/>
+                  </a:ext>
+                </a:extLst>
+              </p:cNvPr>
+              <p:cNvSpPr/>
+              <p:nvPr/>
+            </p:nvSpPr>
+            <p:spPr>
+              <a:xfrm>
+                <a:off x="6549264" y="3785824"/>
+                <a:ext cx="1447349" cy="348116"/>
+              </a:xfrm>
+              <a:prstGeom prst="rect">
+                <a:avLst/>
+              </a:prstGeom>
+              <a:noFill/>
+              <a:ln w="19050">
+                <a:solidFill>
+                  <a:schemeClr val="tx1"/>
+                </a:solidFill>
+              </a:ln>
+            </p:spPr>
+            <p:style>
+              <a:lnRef idx="2">
+                <a:schemeClr val="accent1">
+                  <a:shade val="50000"/>
+                </a:schemeClr>
+              </a:lnRef>
+              <a:fillRef idx="1">
+                <a:schemeClr val="accent1"/>
+              </a:fillRef>
+              <a:effectRef idx="0">
+                <a:schemeClr val="accent1"/>
+              </a:effectRef>
+              <a:fontRef idx="minor">
+                <a:schemeClr val="lt1"/>
+              </a:fontRef>
+            </p:style>
+            <p:txBody>
+              <a:bodyPr rtlCol="0" anchor="ctr"/>
+              <a:lstStyle/>
+              <a:p>
+                <a:pPr algn="ctr"/>
+                <a:endParaRPr kumimoji="1" lang="zh-TW" altLang="en-US" dirty="0">
+                  <a:latin typeface="SimSun" panose="02010600030101010101" pitchFamily="2" charset="-122"/>
+                  <a:ea typeface="SimSun" panose="02010600030101010101" pitchFamily="2" charset="-122"/>
+                </a:endParaRPr>
+              </a:p>
+            </p:txBody>
+          </p:sp>
+          <p:sp>
+            <p:nvSpPr>
+              <p:cNvPr id="51" name="文字方塊 50">
+                <a:extLst>
+                  <a:ext uri="{FF2B5EF4-FFF2-40B4-BE49-F238E27FC236}">
+                    <a16:creationId xmlns:a16="http://schemas.microsoft.com/office/drawing/2014/main" id="{A61CB90C-5951-1D43-8730-E412438125BE}"/>
+                  </a:ext>
+                </a:extLst>
+              </p:cNvPr>
+              <p:cNvSpPr txBox="1"/>
+              <p:nvPr/>
+            </p:nvSpPr>
+            <p:spPr>
+              <a:xfrm>
+                <a:off x="6507344" y="3778828"/>
+                <a:ext cx="1531188" cy="323165"/>
+              </a:xfrm>
+              <a:prstGeom prst="rect">
+                <a:avLst/>
+              </a:prstGeom>
+              <a:noFill/>
+            </p:spPr>
+            <p:txBody>
+              <a:bodyPr wrap="square" rtlCol="0">
+                <a:spAutoFit/>
+              </a:bodyPr>
+              <a:lstStyle/>
+              <a:p>
+                <a:pPr algn="ctr"/>
+                <a:r>
+                  <a:rPr kumimoji="1" lang="zh-TW" altLang="en-US" sz="1500" dirty="0">
+                    <a:latin typeface="SimSun" panose="02010600030101010101" pitchFamily="2" charset="-122"/>
+                    <a:ea typeface="SimSun" panose="02010600030101010101" pitchFamily="2" charset="-122"/>
+                  </a:rPr>
+                  <a:t>国家的濡化能力</a:t>
+                </a:r>
+              </a:p>
+            </p:txBody>
+          </p:sp>
+        </p:grpSp>
+        <p:grpSp>
+          <p:nvGrpSpPr>
+            <p:cNvPr id="52" name="群組 51">
+              <a:extLst>
+                <a:ext uri="{FF2B5EF4-FFF2-40B4-BE49-F238E27FC236}">
+                  <a16:creationId xmlns:a16="http://schemas.microsoft.com/office/drawing/2014/main" id="{CD5E4DAC-F601-DF47-85D7-E7F7ACAC47B6}"/>
+                </a:ext>
+              </a:extLst>
+            </p:cNvPr>
+            <p:cNvGrpSpPr/>
+            <p:nvPr/>
+          </p:nvGrpSpPr>
+          <p:grpSpPr>
+            <a:xfrm>
+              <a:off x="8229679" y="3698949"/>
+              <a:ext cx="1531188" cy="355112"/>
+              <a:chOff x="6507344" y="3778828"/>
+              <a:chExt cx="1531188" cy="355112"/>
+            </a:xfrm>
+          </p:grpSpPr>
+          <p:sp>
+            <p:nvSpPr>
+              <p:cNvPr id="53" name="矩形 52">
+                <a:extLst>
+                  <a:ext uri="{FF2B5EF4-FFF2-40B4-BE49-F238E27FC236}">
+                    <a16:creationId xmlns:a16="http://schemas.microsoft.com/office/drawing/2014/main" id="{7D7615B7-4F22-F646-8E04-5449865C3E6D}"/>
+                  </a:ext>
+                </a:extLst>
+              </p:cNvPr>
+              <p:cNvSpPr/>
+              <p:nvPr/>
+            </p:nvSpPr>
+            <p:spPr>
+              <a:xfrm>
+                <a:off x="6549264" y="3785824"/>
+                <a:ext cx="1447349" cy="348116"/>
+              </a:xfrm>
+              <a:prstGeom prst="rect">
+                <a:avLst/>
+              </a:prstGeom>
+              <a:noFill/>
+              <a:ln w="19050">
+                <a:solidFill>
+                  <a:schemeClr val="tx1"/>
+                </a:solidFill>
+              </a:ln>
+            </p:spPr>
+            <p:style>
+              <a:lnRef idx="2">
+                <a:schemeClr val="accent1">
+                  <a:shade val="50000"/>
+                </a:schemeClr>
+              </a:lnRef>
+              <a:fillRef idx="1">
+                <a:schemeClr val="accent1"/>
+              </a:fillRef>
+              <a:effectRef idx="0">
+                <a:schemeClr val="accent1"/>
+              </a:effectRef>
+              <a:fontRef idx="minor">
+                <a:schemeClr val="lt1"/>
+              </a:fontRef>
+            </p:style>
+            <p:txBody>
+              <a:bodyPr rtlCol="0" anchor="ctr"/>
+              <a:lstStyle/>
+              <a:p>
+                <a:pPr algn="ctr"/>
+                <a:endParaRPr kumimoji="1" lang="zh-TW" altLang="en-US" dirty="0">
+                  <a:latin typeface="SimSun" panose="02010600030101010101" pitchFamily="2" charset="-122"/>
+                  <a:ea typeface="SimSun" panose="02010600030101010101" pitchFamily="2" charset="-122"/>
+                </a:endParaRPr>
+              </a:p>
+            </p:txBody>
+          </p:sp>
+          <p:sp>
+            <p:nvSpPr>
+              <p:cNvPr id="54" name="文字方塊 53">
+                <a:extLst>
+                  <a:ext uri="{FF2B5EF4-FFF2-40B4-BE49-F238E27FC236}">
+                    <a16:creationId xmlns:a16="http://schemas.microsoft.com/office/drawing/2014/main" id="{58A8C568-D84F-C146-9844-0AD86F2471AD}"/>
+                  </a:ext>
+                </a:extLst>
+              </p:cNvPr>
+              <p:cNvSpPr txBox="1"/>
+              <p:nvPr/>
+            </p:nvSpPr>
+            <p:spPr>
+              <a:xfrm>
+                <a:off x="6507344" y="3778828"/>
+                <a:ext cx="1531188" cy="323165"/>
+              </a:xfrm>
+              <a:prstGeom prst="rect">
+                <a:avLst/>
+              </a:prstGeom>
+              <a:noFill/>
+            </p:spPr>
+            <p:txBody>
+              <a:bodyPr wrap="square" rtlCol="0">
+                <a:spAutoFit/>
+              </a:bodyPr>
+              <a:lstStyle/>
+              <a:p>
+                <a:pPr algn="ctr"/>
+                <a:r>
+                  <a:rPr kumimoji="1" lang="zh-TW" altLang="en-US" sz="1500" dirty="0">
+                    <a:latin typeface="SimSun" panose="02010600030101010101" pitchFamily="2" charset="-122"/>
+                    <a:ea typeface="SimSun" panose="02010600030101010101" pitchFamily="2" charset="-122"/>
+                  </a:rPr>
+                  <a:t>国家的规制能力</a:t>
+                </a:r>
+              </a:p>
+            </p:txBody>
+          </p:sp>
+        </p:grpSp>
+        <p:grpSp>
+          <p:nvGrpSpPr>
+            <p:cNvPr id="55" name="群組 54">
+              <a:extLst>
+                <a:ext uri="{FF2B5EF4-FFF2-40B4-BE49-F238E27FC236}">
+                  <a16:creationId xmlns:a16="http://schemas.microsoft.com/office/drawing/2014/main" id="{F6626796-E402-8F49-B9F6-2403E7644EDF}"/>
+                </a:ext>
+              </a:extLst>
+            </p:cNvPr>
+            <p:cNvGrpSpPr/>
+            <p:nvPr/>
+          </p:nvGrpSpPr>
+          <p:grpSpPr>
+            <a:xfrm>
+              <a:off x="8229679" y="4134503"/>
+              <a:ext cx="1531188" cy="355112"/>
+              <a:chOff x="6507344" y="3778828"/>
+              <a:chExt cx="1531188" cy="355112"/>
+            </a:xfrm>
+          </p:grpSpPr>
+          <p:sp>
+            <p:nvSpPr>
+              <p:cNvPr id="56" name="矩形 55">
+                <a:extLst>
+                  <a:ext uri="{FF2B5EF4-FFF2-40B4-BE49-F238E27FC236}">
+                    <a16:creationId xmlns:a16="http://schemas.microsoft.com/office/drawing/2014/main" id="{7CEB87FB-8932-6A4A-A8D0-58952438AFB6}"/>
+                  </a:ext>
+                </a:extLst>
+              </p:cNvPr>
+              <p:cNvSpPr/>
+              <p:nvPr/>
+            </p:nvSpPr>
+            <p:spPr>
+              <a:xfrm>
+                <a:off x="6549264" y="3785824"/>
+                <a:ext cx="1447349" cy="348116"/>
+              </a:xfrm>
+              <a:prstGeom prst="rect">
+                <a:avLst/>
+              </a:prstGeom>
+              <a:noFill/>
+              <a:ln w="19050">
+                <a:solidFill>
+                  <a:schemeClr val="tx1"/>
+                </a:solidFill>
+              </a:ln>
+            </p:spPr>
+            <p:style>
+              <a:lnRef idx="2">
+                <a:schemeClr val="accent1">
+                  <a:shade val="50000"/>
+                </a:schemeClr>
+              </a:lnRef>
+              <a:fillRef idx="1">
+                <a:schemeClr val="accent1"/>
+              </a:fillRef>
+              <a:effectRef idx="0">
+                <a:schemeClr val="accent1"/>
+              </a:effectRef>
+              <a:fontRef idx="minor">
+                <a:schemeClr val="lt1"/>
+              </a:fontRef>
+            </p:style>
+            <p:txBody>
+              <a:bodyPr rtlCol="0" anchor="ctr"/>
+              <a:lstStyle/>
+              <a:p>
+                <a:pPr algn="ctr"/>
+                <a:endParaRPr kumimoji="1" lang="zh-TW" altLang="en-US" dirty="0">
+                  <a:latin typeface="SimSun" panose="02010600030101010101" pitchFamily="2" charset="-122"/>
+                  <a:ea typeface="SimSun" panose="02010600030101010101" pitchFamily="2" charset="-122"/>
+                </a:endParaRPr>
+              </a:p>
+            </p:txBody>
+          </p:sp>
+          <p:sp>
+            <p:nvSpPr>
+              <p:cNvPr id="57" name="文字方塊 56">
+                <a:extLst>
+                  <a:ext uri="{FF2B5EF4-FFF2-40B4-BE49-F238E27FC236}">
+                    <a16:creationId xmlns:a16="http://schemas.microsoft.com/office/drawing/2014/main" id="{2AB9FC69-F044-D545-8AC5-A6C210228047}"/>
+                  </a:ext>
+                </a:extLst>
+              </p:cNvPr>
+              <p:cNvSpPr txBox="1"/>
+              <p:nvPr/>
+            </p:nvSpPr>
+            <p:spPr>
+              <a:xfrm>
+                <a:off x="6507344" y="3778828"/>
+                <a:ext cx="1531188" cy="323165"/>
+              </a:xfrm>
+              <a:prstGeom prst="rect">
+                <a:avLst/>
+              </a:prstGeom>
+              <a:noFill/>
+            </p:spPr>
+            <p:txBody>
+              <a:bodyPr wrap="square" rtlCol="0">
+                <a:spAutoFit/>
+              </a:bodyPr>
+              <a:lstStyle/>
+              <a:p>
+                <a:pPr algn="ctr"/>
+                <a:r>
+                  <a:rPr kumimoji="1" lang="zh-TW" altLang="en-US" sz="1500" dirty="0">
+                    <a:latin typeface="SimSun" panose="02010600030101010101" pitchFamily="2" charset="-122"/>
+                    <a:ea typeface="SimSun" panose="02010600030101010101" pitchFamily="2" charset="-122"/>
+                  </a:rPr>
+                  <a:t>国家的统领能力</a:t>
+                </a:r>
+              </a:p>
+            </p:txBody>
+          </p:sp>
+        </p:grpSp>
+        <p:grpSp>
+          <p:nvGrpSpPr>
+            <p:cNvPr id="58" name="群組 57">
+              <a:extLst>
+                <a:ext uri="{FF2B5EF4-FFF2-40B4-BE49-F238E27FC236}">
+                  <a16:creationId xmlns:a16="http://schemas.microsoft.com/office/drawing/2014/main" id="{61EA930E-B003-E043-9E12-4A415D7A02B2}"/>
+                </a:ext>
+              </a:extLst>
+            </p:cNvPr>
+            <p:cNvGrpSpPr/>
+            <p:nvPr/>
+          </p:nvGrpSpPr>
+          <p:grpSpPr>
+            <a:xfrm>
+              <a:off x="8229679" y="4570057"/>
+              <a:ext cx="1531188" cy="355112"/>
+              <a:chOff x="6507344" y="3778828"/>
+              <a:chExt cx="1531188" cy="355112"/>
+            </a:xfrm>
+          </p:grpSpPr>
+          <p:sp>
+            <p:nvSpPr>
+              <p:cNvPr id="59" name="矩形 58">
+                <a:extLst>
+                  <a:ext uri="{FF2B5EF4-FFF2-40B4-BE49-F238E27FC236}">
+                    <a16:creationId xmlns:a16="http://schemas.microsoft.com/office/drawing/2014/main" id="{C5070EE3-6AC2-3D4B-A42D-4C3E00F0E030}"/>
+                  </a:ext>
+                </a:extLst>
+              </p:cNvPr>
+              <p:cNvSpPr/>
+              <p:nvPr/>
+            </p:nvSpPr>
+            <p:spPr>
+              <a:xfrm>
+                <a:off x="6549264" y="3785824"/>
+                <a:ext cx="1447349" cy="348116"/>
+              </a:xfrm>
+              <a:prstGeom prst="rect">
+                <a:avLst/>
+              </a:prstGeom>
+              <a:noFill/>
+              <a:ln w="19050">
+                <a:solidFill>
+                  <a:schemeClr val="tx1"/>
+                </a:solidFill>
+              </a:ln>
+            </p:spPr>
+            <p:style>
+              <a:lnRef idx="2">
+                <a:schemeClr val="accent1">
+                  <a:shade val="50000"/>
+                </a:schemeClr>
+              </a:lnRef>
+              <a:fillRef idx="1">
+                <a:schemeClr val="accent1"/>
+              </a:fillRef>
+              <a:effectRef idx="0">
+                <a:schemeClr val="accent1"/>
+              </a:effectRef>
+              <a:fontRef idx="minor">
+                <a:schemeClr val="lt1"/>
+              </a:fontRef>
+            </p:style>
+            <p:txBody>
+              <a:bodyPr rtlCol="0" anchor="ctr"/>
+              <a:lstStyle/>
+              <a:p>
+                <a:pPr algn="ctr"/>
+                <a:endParaRPr kumimoji="1" lang="zh-TW" altLang="en-US" dirty="0">
+                  <a:latin typeface="SimSun" panose="02010600030101010101" pitchFamily="2" charset="-122"/>
+                  <a:ea typeface="SimSun" panose="02010600030101010101" pitchFamily="2" charset="-122"/>
+                </a:endParaRPr>
+              </a:p>
+            </p:txBody>
+          </p:sp>
+          <p:sp>
+            <p:nvSpPr>
+              <p:cNvPr id="60" name="文字方塊 59">
+                <a:extLst>
+                  <a:ext uri="{FF2B5EF4-FFF2-40B4-BE49-F238E27FC236}">
+                    <a16:creationId xmlns:a16="http://schemas.microsoft.com/office/drawing/2014/main" id="{196F2C95-4A87-DC49-9429-7C0F9B1ECC79}"/>
+                  </a:ext>
+                </a:extLst>
+              </p:cNvPr>
+              <p:cNvSpPr txBox="1"/>
+              <p:nvPr/>
+            </p:nvSpPr>
+            <p:spPr>
+              <a:xfrm>
+                <a:off x="6507344" y="3778828"/>
+                <a:ext cx="1531188" cy="292388"/>
+              </a:xfrm>
+              <a:prstGeom prst="rect">
+                <a:avLst/>
+              </a:prstGeom>
+              <a:noFill/>
+            </p:spPr>
+            <p:txBody>
+              <a:bodyPr wrap="square" rtlCol="0">
+                <a:spAutoFit/>
+              </a:bodyPr>
+              <a:lstStyle/>
+              <a:p>
+                <a:pPr algn="ctr"/>
+                <a:r>
+                  <a:rPr kumimoji="1" lang="zh-TW" altLang="en-US" sz="1300" dirty="0">
+                    <a:latin typeface="SimSun" panose="02010600030101010101" pitchFamily="2" charset="-122"/>
+                    <a:ea typeface="SimSun" panose="02010600030101010101" pitchFamily="2" charset="-122"/>
+                  </a:rPr>
+                  <a:t>国家的再分配能力</a:t>
+                </a:r>
+              </a:p>
+            </p:txBody>
+          </p:sp>
+        </p:grpSp>
+        <p:sp>
+          <p:nvSpPr>
+            <p:cNvPr id="61" name="矩形 60">
+              <a:extLst>
+                <a:ext uri="{FF2B5EF4-FFF2-40B4-BE49-F238E27FC236}">
+                  <a16:creationId xmlns:a16="http://schemas.microsoft.com/office/drawing/2014/main" id="{D36A52E9-218E-7044-8DD8-4EB082BF0542}"/>
+                </a:ext>
+              </a:extLst>
+            </p:cNvPr>
+            <p:cNvSpPr/>
+            <p:nvPr/>
+          </p:nvSpPr>
+          <p:spPr>
+            <a:xfrm>
+              <a:off x="6567055" y="3321969"/>
+              <a:ext cx="3308465" cy="1931675"/>
+            </a:xfrm>
+            <a:prstGeom prst="rect">
+              <a:avLst/>
+            </a:prstGeom>
+            <a:noFill/>
+            <a:ln w="19050">
+              <a:solidFill>
+                <a:schemeClr val="tx1"/>
+              </a:solidFill>
+              <a:prstDash val="dash"/>
+            </a:ln>
+          </p:spPr>
+          <p:style>
+            <a:lnRef idx="2">
+              <a:schemeClr val="accent1">
+                <a:shade val="50000"/>
+              </a:schemeClr>
+            </a:lnRef>
+            <a:fillRef idx="1">
+              <a:schemeClr val="accent1"/>
+            </a:fillRef>
+            <a:effectRef idx="0">
+              <a:schemeClr val="accent1"/>
+            </a:effectRef>
+            <a:fontRef idx="minor">
+              <a:schemeClr val="lt1"/>
+            </a:fontRef>
+          </p:style>
+          <p:txBody>
+            <a:bodyPr rtlCol="0" anchor="ctr"/>
+            <a:lstStyle/>
+            <a:p>
+              <a:pPr algn="ctr"/>
+              <a:endParaRPr kumimoji="1" lang="zh-TW" altLang="en-US"/>
+            </a:p>
+          </p:txBody>
+        </p:sp>
+      </p:grpSp>
+      <p:grpSp>
+        <p:nvGrpSpPr>
+          <p:cNvPr id="63" name="群組 62">
+            <a:extLst>
+              <a:ext uri="{FF2B5EF4-FFF2-40B4-BE49-F238E27FC236}">
+                <a16:creationId xmlns:a16="http://schemas.microsoft.com/office/drawing/2014/main" id="{B4318845-3F2F-0A4A-B628-DA9B5D6FD2E8}"/>
+              </a:ext>
+            </a:extLst>
+          </p:cNvPr>
+          <p:cNvGrpSpPr/>
+          <p:nvPr/>
+        </p:nvGrpSpPr>
+        <p:grpSpPr>
+          <a:xfrm>
+            <a:off x="279223" y="2421742"/>
+            <a:ext cx="1447349" cy="522487"/>
+            <a:chOff x="2837279" y="1256499"/>
+            <a:chExt cx="1447349" cy="522487"/>
+          </a:xfrm>
+        </p:grpSpPr>
+        <p:sp>
+          <p:nvSpPr>
+            <p:cNvPr id="64" name="矩形 63">
+              <a:extLst>
+                <a:ext uri="{FF2B5EF4-FFF2-40B4-BE49-F238E27FC236}">
+                  <a16:creationId xmlns:a16="http://schemas.microsoft.com/office/drawing/2014/main" id="{9A2856B6-EE25-054F-8D90-C213327483AB}"/>
+                </a:ext>
+              </a:extLst>
+            </p:cNvPr>
+            <p:cNvSpPr/>
+            <p:nvPr/>
+          </p:nvSpPr>
+          <p:spPr>
+            <a:xfrm>
+              <a:off x="2837279" y="1256499"/>
+              <a:ext cx="1447349" cy="522487"/>
+            </a:xfrm>
+            <a:prstGeom prst="rect">
+              <a:avLst/>
+            </a:prstGeom>
+            <a:noFill/>
+            <a:ln w="19050">
+              <a:solidFill>
+                <a:schemeClr val="tx1"/>
+              </a:solidFill>
+            </a:ln>
+          </p:spPr>
+          <p:style>
+            <a:lnRef idx="2">
+              <a:schemeClr val="accent1">
+                <a:shade val="50000"/>
+              </a:schemeClr>
+            </a:lnRef>
+            <a:fillRef idx="1">
+              <a:schemeClr val="accent1"/>
+            </a:fillRef>
+            <a:effectRef idx="0">
+              <a:schemeClr val="accent1"/>
+            </a:effectRef>
+            <a:fontRef idx="minor">
+              <a:schemeClr val="lt1"/>
+            </a:fontRef>
+          </p:style>
+          <p:txBody>
+            <a:bodyPr rtlCol="0" anchor="ctr"/>
+            <a:lstStyle/>
+            <a:p>
+              <a:pPr algn="ctr"/>
+              <a:endParaRPr kumimoji="1" lang="zh-TW" altLang="en-US" dirty="0">
+                <a:latin typeface="SimSun" panose="02010600030101010101" pitchFamily="2" charset="-122"/>
+                <a:ea typeface="SimSun" panose="02010600030101010101" pitchFamily="2" charset="-122"/>
+              </a:endParaRPr>
+            </a:p>
+          </p:txBody>
+        </p:sp>
+        <p:sp>
+          <p:nvSpPr>
+            <p:cNvPr id="65" name="文字方塊 64">
+              <a:extLst>
+                <a:ext uri="{FF2B5EF4-FFF2-40B4-BE49-F238E27FC236}">
+                  <a16:creationId xmlns:a16="http://schemas.microsoft.com/office/drawing/2014/main" id="{F85B2B58-EC65-F345-86AA-7200C9DE5F06}"/>
+                </a:ext>
+              </a:extLst>
+            </p:cNvPr>
+            <p:cNvSpPr txBox="1"/>
+            <p:nvPr/>
+          </p:nvSpPr>
+          <p:spPr>
+            <a:xfrm>
+              <a:off x="2882997" y="1330926"/>
+              <a:ext cx="1338828" cy="369332"/>
+            </a:xfrm>
+            <a:prstGeom prst="rect">
+              <a:avLst/>
+            </a:prstGeom>
+            <a:noFill/>
+          </p:spPr>
+          <p:txBody>
+            <a:bodyPr wrap="none" rtlCol="0">
+              <a:spAutoFit/>
+            </a:bodyPr>
+            <a:lstStyle/>
+            <a:p>
+              <a:pPr algn="ctr"/>
+              <a:r>
+                <a:rPr kumimoji="1" lang="zh-TW" altLang="en-US" dirty="0">
+                  <a:latin typeface="SimSun" panose="02010600030101010101" pitchFamily="2" charset="-122"/>
+                  <a:ea typeface="SimSun" panose="02010600030101010101" pitchFamily="2" charset="-122"/>
+                </a:rPr>
+                <a:t>思政课学习</a:t>
+              </a:r>
+            </a:p>
+          </p:txBody>
+        </p:sp>
+      </p:grpSp>
+      <p:sp>
+        <p:nvSpPr>
+          <p:cNvPr id="83" name="向右箭號 82">
+            <a:extLst>
+              <a:ext uri="{FF2B5EF4-FFF2-40B4-BE49-F238E27FC236}">
+                <a16:creationId xmlns:a16="http://schemas.microsoft.com/office/drawing/2014/main" id="{E037E463-96C8-7B47-81FB-E445A8C4B9BA}"/>
+              </a:ext>
+            </a:extLst>
+          </p:cNvPr>
+          <p:cNvSpPr/>
+          <p:nvPr/>
+        </p:nvSpPr>
+        <p:spPr>
+          <a:xfrm>
+            <a:off x="1838415" y="2514931"/>
+            <a:ext cx="340500" cy="350570"/>
+          </a:xfrm>
+          <a:prstGeom prst="rightArrow">
+            <a:avLst/>
+          </a:prstGeom>
+          <a:solidFill>
+            <a:schemeClr val="tx1"/>
+          </a:solidFill>
+          <a:ln>
+            <a:solidFill>
+              <a:schemeClr val="tx1"/>
+            </a:solidFill>
+          </a:ln>
+        </p:spPr>
+        <p:style>
+          <a:lnRef idx="2">
+            <a:schemeClr val="accent1">
+              <a:shade val="50000"/>
+            </a:schemeClr>
+          </a:lnRef>
+          <a:fillRef idx="1">
+            <a:schemeClr val="accent1"/>
+          </a:fillRef>
+          <a:effectRef idx="0">
+            <a:schemeClr val="accent1"/>
+          </a:effectRef>
+          <a:fontRef idx="minor">
+            <a:schemeClr val="lt1"/>
+          </a:fontRef>
+        </p:style>
+        <p:txBody>
+          <a:bodyPr rtlCol="0" anchor="ctr"/>
+          <a:lstStyle/>
+          <a:p>
+            <a:pPr algn="ctr"/>
+            <a:endParaRPr kumimoji="1" lang="zh-TW" altLang="en-US"/>
+          </a:p>
+        </p:txBody>
+      </p:sp>
+      <p:sp>
+        <p:nvSpPr>
+          <p:cNvPr id="78" name="文字方塊 77">
+            <a:extLst>
+              <a:ext uri="{FF2B5EF4-FFF2-40B4-BE49-F238E27FC236}">
+                <a16:creationId xmlns:a16="http://schemas.microsoft.com/office/drawing/2014/main" id="{3065BC93-8103-E746-B34C-48EF57D46B03}"/>
+              </a:ext>
+            </a:extLst>
+          </p:cNvPr>
+          <p:cNvSpPr txBox="1"/>
+          <p:nvPr/>
+        </p:nvSpPr>
+        <p:spPr>
+          <a:xfrm>
+            <a:off x="5233426" y="1334628"/>
+            <a:ext cx="1440912" cy="323165"/>
+          </a:xfrm>
+          <a:prstGeom prst="rect">
+            <a:avLst/>
+          </a:prstGeom>
+          <a:noFill/>
+        </p:spPr>
+        <p:txBody>
+          <a:bodyPr wrap="square" rtlCol="0">
+            <a:spAutoFit/>
+          </a:bodyPr>
+          <a:lstStyle/>
+          <a:p>
+            <a:r>
+              <a:rPr kumimoji="1" lang="zh-TW" altLang="en-US" sz="1500" b="1" dirty="0">
+                <a:latin typeface="SimSun" panose="02010600030101010101" pitchFamily="2" charset="-122"/>
+                <a:ea typeface="SimSun" panose="02010600030101010101" pitchFamily="2" charset="-122"/>
+              </a:rPr>
+              <a:t>国家能力感知</a:t>
+            </a:r>
+          </a:p>
+        </p:txBody>
+      </p:sp>
+      <p:sp>
+        <p:nvSpPr>
+          <p:cNvPr id="80" name="向右箭號 79">
+            <a:extLst>
+              <a:ext uri="{FF2B5EF4-FFF2-40B4-BE49-F238E27FC236}">
+                <a16:creationId xmlns:a16="http://schemas.microsoft.com/office/drawing/2014/main" id="{CD904F54-BE52-F147-B300-6D5BCED35D42}"/>
+              </a:ext>
+            </a:extLst>
+          </p:cNvPr>
+          <p:cNvSpPr/>
+          <p:nvPr/>
+        </p:nvSpPr>
+        <p:spPr>
+          <a:xfrm>
+            <a:off x="8653734" y="2518518"/>
+            <a:ext cx="340500" cy="350570"/>
+          </a:xfrm>
+          <a:prstGeom prst="rightArrow">
+            <a:avLst/>
+          </a:prstGeom>
+          <a:solidFill>
+            <a:schemeClr val="tx1"/>
+          </a:solidFill>
+          <a:ln>
+            <a:solidFill>
+              <a:schemeClr val="tx1"/>
+            </a:solidFill>
+          </a:ln>
+        </p:spPr>
+        <p:style>
+          <a:lnRef idx="2">
+            <a:schemeClr val="accent1">
+              <a:shade val="50000"/>
+            </a:schemeClr>
+          </a:lnRef>
+          <a:fillRef idx="1">
+            <a:schemeClr val="accent1"/>
+          </a:fillRef>
+          <a:effectRef idx="0">
+            <a:schemeClr val="accent1"/>
+          </a:effectRef>
+          <a:fontRef idx="minor">
+            <a:schemeClr val="lt1"/>
+          </a:fontRef>
+        </p:style>
+        <p:txBody>
+          <a:bodyPr rtlCol="0" anchor="ctr"/>
+          <a:lstStyle/>
+          <a:p>
+            <a:pPr algn="ctr"/>
+            <a:endParaRPr kumimoji="1" lang="zh-TW" altLang="en-US"/>
+          </a:p>
+        </p:txBody>
+      </p:sp>
+      <p:grpSp>
+        <p:nvGrpSpPr>
+          <p:cNvPr id="87" name="群組 86">
+            <a:extLst>
+              <a:ext uri="{FF2B5EF4-FFF2-40B4-BE49-F238E27FC236}">
+                <a16:creationId xmlns:a16="http://schemas.microsoft.com/office/drawing/2014/main" id="{A79C1EED-411C-4945-8FB8-980FFC1773F4}"/>
+              </a:ext>
+            </a:extLst>
+          </p:cNvPr>
+          <p:cNvGrpSpPr/>
+          <p:nvPr/>
+        </p:nvGrpSpPr>
+        <p:grpSpPr>
+          <a:xfrm>
+            <a:off x="9106078" y="2090198"/>
+            <a:ext cx="1447349" cy="522487"/>
+            <a:chOff x="2825393" y="1356189"/>
+            <a:chExt cx="1447349" cy="522487"/>
+          </a:xfrm>
+        </p:grpSpPr>
+        <p:sp>
+          <p:nvSpPr>
+            <p:cNvPr id="88" name="矩形 87">
+              <a:extLst>
+                <a:ext uri="{FF2B5EF4-FFF2-40B4-BE49-F238E27FC236}">
+                  <a16:creationId xmlns:a16="http://schemas.microsoft.com/office/drawing/2014/main" id="{14B58E96-1B5B-A649-B8D2-68E3FF78F8BD}"/>
+                </a:ext>
+              </a:extLst>
+            </p:cNvPr>
+            <p:cNvSpPr/>
+            <p:nvPr/>
+          </p:nvSpPr>
+          <p:spPr>
+            <a:xfrm>
+              <a:off x="2825393" y="1356189"/>
+              <a:ext cx="1447349" cy="522487"/>
+            </a:xfrm>
+            <a:prstGeom prst="rect">
+              <a:avLst/>
+            </a:prstGeom>
+            <a:noFill/>
+            <a:ln w="19050">
+              <a:solidFill>
+                <a:schemeClr val="tx1"/>
+              </a:solidFill>
+            </a:ln>
+          </p:spPr>
+          <p:style>
+            <a:lnRef idx="2">
+              <a:schemeClr val="accent1">
+                <a:shade val="50000"/>
+              </a:schemeClr>
+            </a:lnRef>
+            <a:fillRef idx="1">
+              <a:schemeClr val="accent1"/>
+            </a:fillRef>
+            <a:effectRef idx="0">
+              <a:schemeClr val="accent1"/>
+            </a:effectRef>
+            <a:fontRef idx="minor">
+              <a:schemeClr val="lt1"/>
+            </a:fontRef>
+          </p:style>
+          <p:txBody>
+            <a:bodyPr rtlCol="0" anchor="ctr"/>
+            <a:lstStyle/>
+            <a:p>
+              <a:pPr algn="ctr"/>
+              <a:endParaRPr kumimoji="1" lang="zh-TW" altLang="en-US" dirty="0">
+                <a:latin typeface="SimSun" panose="02010600030101010101" pitchFamily="2" charset="-122"/>
+                <a:ea typeface="SimSun" panose="02010600030101010101" pitchFamily="2" charset="-122"/>
+              </a:endParaRPr>
+            </a:p>
+          </p:txBody>
+        </p:sp>
+        <p:sp>
+          <p:nvSpPr>
+            <p:cNvPr id="89" name="文字方塊 88">
+              <a:extLst>
+                <a:ext uri="{FF2B5EF4-FFF2-40B4-BE49-F238E27FC236}">
+                  <a16:creationId xmlns:a16="http://schemas.microsoft.com/office/drawing/2014/main" id="{310E77B8-D246-BF44-83E5-5B007CF727B7}"/>
+                </a:ext>
+              </a:extLst>
+            </p:cNvPr>
+            <p:cNvSpPr txBox="1"/>
+            <p:nvPr/>
+          </p:nvSpPr>
+          <p:spPr>
+            <a:xfrm>
+              <a:off x="2986519" y="1416678"/>
+              <a:ext cx="1107996" cy="369332"/>
+            </a:xfrm>
+            <a:prstGeom prst="rect">
+              <a:avLst/>
+            </a:prstGeom>
+            <a:noFill/>
+          </p:spPr>
+          <p:txBody>
+            <a:bodyPr wrap="none" rtlCol="0">
+              <a:spAutoFit/>
+            </a:bodyPr>
+            <a:lstStyle/>
+            <a:p>
+              <a:pPr algn="ctr"/>
+              <a:r>
+                <a:rPr kumimoji="1" lang="zh-TW" altLang="en-US" dirty="0">
+                  <a:latin typeface="SimSun" panose="02010600030101010101" pitchFamily="2" charset="-122"/>
+                  <a:ea typeface="SimSun" panose="02010600030101010101" pitchFamily="2" charset="-122"/>
+                </a:rPr>
+                <a:t>认同增强</a:t>
+              </a:r>
+            </a:p>
+          </p:txBody>
+        </p:sp>
+      </p:grpSp>
+      <p:grpSp>
+        <p:nvGrpSpPr>
+          <p:cNvPr id="90" name="群組 89">
+            <a:extLst>
+              <a:ext uri="{FF2B5EF4-FFF2-40B4-BE49-F238E27FC236}">
+                <a16:creationId xmlns:a16="http://schemas.microsoft.com/office/drawing/2014/main" id="{76FB7582-317C-0742-BB5D-8E1A61251377}"/>
+              </a:ext>
+            </a:extLst>
+          </p:cNvPr>
+          <p:cNvGrpSpPr/>
+          <p:nvPr/>
+        </p:nvGrpSpPr>
+        <p:grpSpPr>
+          <a:xfrm>
+            <a:off x="9106077" y="2713612"/>
+            <a:ext cx="1447349" cy="522487"/>
+            <a:chOff x="2825393" y="1356189"/>
+            <a:chExt cx="1447349" cy="522487"/>
+          </a:xfrm>
+        </p:grpSpPr>
+        <p:sp>
+          <p:nvSpPr>
+            <p:cNvPr id="91" name="矩形 90">
+              <a:extLst>
+                <a:ext uri="{FF2B5EF4-FFF2-40B4-BE49-F238E27FC236}">
+                  <a16:creationId xmlns:a16="http://schemas.microsoft.com/office/drawing/2014/main" id="{9BE7BE12-A1B3-8C47-B2B1-3DFC06B74105}"/>
+                </a:ext>
+              </a:extLst>
+            </p:cNvPr>
+            <p:cNvSpPr/>
+            <p:nvPr/>
+          </p:nvSpPr>
+          <p:spPr>
+            <a:xfrm>
+              <a:off x="2825393" y="1356189"/>
+              <a:ext cx="1447349" cy="522487"/>
+            </a:xfrm>
+            <a:prstGeom prst="rect">
+              <a:avLst/>
+            </a:prstGeom>
+            <a:noFill/>
+            <a:ln w="19050">
+              <a:solidFill>
+                <a:schemeClr val="tx1"/>
+              </a:solidFill>
+            </a:ln>
+          </p:spPr>
+          <p:style>
+            <a:lnRef idx="2">
+              <a:schemeClr val="accent1">
+                <a:shade val="50000"/>
+              </a:schemeClr>
+            </a:lnRef>
+            <a:fillRef idx="1">
+              <a:schemeClr val="accent1"/>
+            </a:fillRef>
+            <a:effectRef idx="0">
+              <a:schemeClr val="accent1"/>
+            </a:effectRef>
+            <a:fontRef idx="minor">
+              <a:schemeClr val="lt1"/>
+            </a:fontRef>
+          </p:style>
+          <p:txBody>
+            <a:bodyPr rtlCol="0" anchor="ctr"/>
+            <a:lstStyle/>
+            <a:p>
+              <a:pPr algn="ctr"/>
+              <a:endParaRPr kumimoji="1" lang="zh-TW" altLang="en-US" dirty="0">
+                <a:latin typeface="SimSun" panose="02010600030101010101" pitchFamily="2" charset="-122"/>
+                <a:ea typeface="SimSun" panose="02010600030101010101" pitchFamily="2" charset="-122"/>
+              </a:endParaRPr>
+            </a:p>
+          </p:txBody>
+        </p:sp>
+        <p:sp>
+          <p:nvSpPr>
+            <p:cNvPr id="92" name="文字方塊 91">
+              <a:extLst>
+                <a:ext uri="{FF2B5EF4-FFF2-40B4-BE49-F238E27FC236}">
+                  <a16:creationId xmlns:a16="http://schemas.microsoft.com/office/drawing/2014/main" id="{71471E91-8CCD-764D-B410-7CF7B3AC1231}"/>
+                </a:ext>
+              </a:extLst>
+            </p:cNvPr>
+            <p:cNvSpPr txBox="1"/>
+            <p:nvPr/>
+          </p:nvSpPr>
+          <p:spPr>
+            <a:xfrm>
+              <a:off x="2995078" y="1432766"/>
+              <a:ext cx="1107996" cy="369332"/>
+            </a:xfrm>
+            <a:prstGeom prst="rect">
+              <a:avLst/>
+            </a:prstGeom>
+            <a:noFill/>
+          </p:spPr>
+          <p:txBody>
+            <a:bodyPr wrap="none" rtlCol="0">
+              <a:spAutoFit/>
+            </a:bodyPr>
+            <a:lstStyle/>
+            <a:p>
+              <a:pPr algn="ctr"/>
+              <a:r>
+                <a:rPr kumimoji="1" lang="zh-TW" altLang="en-US" dirty="0">
+                  <a:latin typeface="SimSun" panose="02010600030101010101" pitchFamily="2" charset="-122"/>
+                  <a:ea typeface="SimSun" panose="02010600030101010101" pitchFamily="2" charset="-122"/>
+                </a:rPr>
+                <a:t>能力感知</a:t>
+              </a:r>
+            </a:p>
+          </p:txBody>
+        </p:sp>
+      </p:grpSp>
+      <p:sp>
+        <p:nvSpPr>
+          <p:cNvPr id="93" name="文字方塊 92">
+            <a:extLst>
+              <a:ext uri="{FF2B5EF4-FFF2-40B4-BE49-F238E27FC236}">
+                <a16:creationId xmlns:a16="http://schemas.microsoft.com/office/drawing/2014/main" id="{DA100E87-BA9D-0C4E-924B-8E432C327D64}"/>
+              </a:ext>
+            </a:extLst>
+          </p:cNvPr>
+          <p:cNvSpPr txBox="1"/>
+          <p:nvPr/>
+        </p:nvSpPr>
+        <p:spPr>
+          <a:xfrm>
+            <a:off x="8994234" y="1334627"/>
+            <a:ext cx="1440912" cy="323165"/>
+          </a:xfrm>
+          <a:prstGeom prst="rect">
+            <a:avLst/>
+          </a:prstGeom>
+          <a:noFill/>
+        </p:spPr>
+        <p:txBody>
+          <a:bodyPr wrap="square" rtlCol="0">
+            <a:spAutoFit/>
+          </a:bodyPr>
+          <a:lstStyle/>
+          <a:p>
+            <a:r>
+              <a:rPr kumimoji="1" lang="zh-TW" altLang="en-US" sz="1500" b="1" dirty="0">
+                <a:latin typeface="SimSun" panose="02010600030101010101" pitchFamily="2" charset="-122"/>
+                <a:ea typeface="SimSun" panose="02010600030101010101" pitchFamily="2" charset="-122"/>
+              </a:rPr>
+              <a:t>教学效果</a:t>
+            </a:r>
+          </a:p>
+        </p:txBody>
+      </p:sp>
+      <p:sp>
+        <p:nvSpPr>
+          <p:cNvPr id="94" name="文字方塊 93">
+            <a:extLst>
+              <a:ext uri="{FF2B5EF4-FFF2-40B4-BE49-F238E27FC236}">
+                <a16:creationId xmlns:a16="http://schemas.microsoft.com/office/drawing/2014/main" id="{7C82CC5C-3C8D-3F4C-A413-7E2AC4695296}"/>
+              </a:ext>
+            </a:extLst>
+          </p:cNvPr>
+          <p:cNvSpPr txBox="1"/>
+          <p:nvPr/>
+        </p:nvSpPr>
+        <p:spPr>
+          <a:xfrm>
+            <a:off x="2213384" y="1334627"/>
+            <a:ext cx="1440912" cy="323165"/>
+          </a:xfrm>
+          <a:prstGeom prst="rect">
+            <a:avLst/>
+          </a:prstGeom>
+          <a:noFill/>
+        </p:spPr>
+        <p:txBody>
+          <a:bodyPr wrap="square" rtlCol="0">
+            <a:spAutoFit/>
+          </a:bodyPr>
+          <a:lstStyle/>
+          <a:p>
+            <a:r>
+              <a:rPr kumimoji="1" lang="zh-TW" altLang="en-US" sz="1500" b="1" dirty="0">
+                <a:latin typeface="SimSun" panose="02010600030101010101" pitchFamily="2" charset="-122"/>
+                <a:ea typeface="SimSun" panose="02010600030101010101" pitchFamily="2" charset="-122"/>
+              </a:rPr>
+              <a:t>教学方式</a:t>
+            </a:r>
+          </a:p>
+        </p:txBody>
+      </p:sp>
+    </p:spTree>
+    <p:extLst>
+      <p:ext uri="{BB962C8B-B14F-4D97-AF65-F5344CB8AC3E}">
+        <p14:creationId xmlns:p14="http://schemas.microsoft.com/office/powerpoint/2010/main" val="1061220165"/>
+      </p:ext>
+    </p:extLst>
+  </p:cSld>
+  <p:clrMapOvr>
+    <a:masterClrMapping/>
+  </p:clrMapOvr>
+</p:sld>
+</file>
+
 <file path=ppt/theme/theme1.xml><?xml version="1.0" encoding="utf-8"?>
 <a:theme xmlns:a="http://schemas.openxmlformats.org/drawingml/2006/main" name="Office 佈景主題">
   <a:themeElements>

</xml_diff>